<commit_message>
Add all assignments and coursework
</commit_message>
<xml_diff>
--- a/Final_Project_Shiny/Final_Project_Presentation.pptx
+++ b/Final_Project_Shiny/Final_Project_Presentation.pptx
@@ -326,7 +326,7 @@
           <a:p>
             <a:fld id="{5BCAD085-E8A6-8845-BD4E-CB4CCA059FC4}" type="datetimeFigureOut">
               <a:rPr lang="en-US" smtClean="0"/>
-              <a:t>12/3/2025</a:t>
+              <a:t>12/4/2025</a:t>
             </a:fld>
             <a:endParaRPr lang="en-US"/>
           </a:p>
@@ -494,7 +494,7 @@
           <a:p>
             <a:fld id="{5BCAD085-E8A6-8845-BD4E-CB4CCA059FC4}" type="datetimeFigureOut">
               <a:rPr lang="en-US" smtClean="0"/>
-              <a:t>12/3/2025</a:t>
+              <a:t>12/4/2025</a:t>
             </a:fld>
             <a:endParaRPr lang="en-US"/>
           </a:p>
@@ -672,7 +672,7 @@
           <a:p>
             <a:fld id="{5BCAD085-E8A6-8845-BD4E-CB4CCA059FC4}" type="datetimeFigureOut">
               <a:rPr lang="en-US" smtClean="0"/>
-              <a:t>12/3/2025</a:t>
+              <a:t>12/4/2025</a:t>
             </a:fld>
             <a:endParaRPr lang="en-US"/>
           </a:p>
@@ -840,7 +840,7 @@
           <a:p>
             <a:fld id="{5BCAD085-E8A6-8845-BD4E-CB4CCA059FC4}" type="datetimeFigureOut">
               <a:rPr lang="en-US" smtClean="0"/>
-              <a:t>12/3/2025</a:t>
+              <a:t>12/4/2025</a:t>
             </a:fld>
             <a:endParaRPr lang="en-US"/>
           </a:p>
@@ -1085,7 +1085,7 @@
           <a:p>
             <a:fld id="{5BCAD085-E8A6-8845-BD4E-CB4CCA059FC4}" type="datetimeFigureOut">
               <a:rPr lang="en-US" smtClean="0"/>
-              <a:t>12/3/2025</a:t>
+              <a:t>12/4/2025</a:t>
             </a:fld>
             <a:endParaRPr lang="en-US"/>
           </a:p>
@@ -1370,7 +1370,7 @@
           <a:p>
             <a:fld id="{5BCAD085-E8A6-8845-BD4E-CB4CCA059FC4}" type="datetimeFigureOut">
               <a:rPr lang="en-US" smtClean="0"/>
-              <a:t>12/3/2025</a:t>
+              <a:t>12/4/2025</a:t>
             </a:fld>
             <a:endParaRPr lang="en-US"/>
           </a:p>
@@ -1789,7 +1789,7 @@
           <a:p>
             <a:fld id="{5BCAD085-E8A6-8845-BD4E-CB4CCA059FC4}" type="datetimeFigureOut">
               <a:rPr lang="en-US" smtClean="0"/>
-              <a:t>12/3/2025</a:t>
+              <a:t>12/4/2025</a:t>
             </a:fld>
             <a:endParaRPr lang="en-US"/>
           </a:p>
@@ -1906,7 +1906,7 @@
           <a:p>
             <a:fld id="{5BCAD085-E8A6-8845-BD4E-CB4CCA059FC4}" type="datetimeFigureOut">
               <a:rPr lang="en-US" smtClean="0"/>
-              <a:t>12/3/2025</a:t>
+              <a:t>12/4/2025</a:t>
             </a:fld>
             <a:endParaRPr lang="en-US"/>
           </a:p>
@@ -2001,7 +2001,7 @@
           <a:p>
             <a:fld id="{5BCAD085-E8A6-8845-BD4E-CB4CCA059FC4}" type="datetimeFigureOut">
               <a:rPr lang="en-US" smtClean="0"/>
-              <a:t>12/3/2025</a:t>
+              <a:t>12/4/2025</a:t>
             </a:fld>
             <a:endParaRPr lang="en-US"/>
           </a:p>
@@ -2276,7 +2276,7 @@
           <a:p>
             <a:fld id="{5BCAD085-E8A6-8845-BD4E-CB4CCA059FC4}" type="datetimeFigureOut">
               <a:rPr lang="en-US" smtClean="0"/>
-              <a:t>12/3/2025</a:t>
+              <a:t>12/4/2025</a:t>
             </a:fld>
             <a:endParaRPr lang="en-US"/>
           </a:p>
@@ -2528,7 +2528,7 @@
           <a:p>
             <a:fld id="{5BCAD085-E8A6-8845-BD4E-CB4CCA059FC4}" type="datetimeFigureOut">
               <a:rPr lang="en-US" smtClean="0"/>
-              <a:t>12/3/2025</a:t>
+              <a:t>12/4/2025</a:t>
             </a:fld>
             <a:endParaRPr lang="en-US"/>
           </a:p>
@@ -2739,7 +2739,7 @@
           <a:p>
             <a:fld id="{5BCAD085-E8A6-8845-BD4E-CB4CCA059FC4}" type="datetimeFigureOut">
               <a:rPr lang="en-US" smtClean="0"/>
-              <a:t>12/3/2025</a:t>
+              <a:t>12/4/2025</a:t>
             </a:fld>
             <a:endParaRPr lang="en-US"/>
           </a:p>
@@ -3156,7 +3156,6 @@
               <a:rPr lang="en-US" dirty="0"/>
               <a:t>Chad Huntebrinker</a:t>
             </a:r>
-            <a:endParaRPr dirty="0"/>
           </a:p>
         </p:txBody>
       </p:sp>
@@ -6646,7 +6645,7 @@
         <p:spPr/>
         <p:txBody>
           <a:bodyPr>
-            <a:normAutofit/>
+            <a:normAutofit lnSpcReduction="10000"/>
           </a:bodyPr>
           <a:lstStyle/>
           <a:p>
@@ -6682,6 +6681,16 @@
               <a:rPr dirty="0"/>
               <a:t>Users can explore trends, strengths, and weaknesses in an intuitive interface</a:t>
             </a:r>
+            <a:endParaRPr lang="en-US" dirty="0"/>
+          </a:p>
+          <a:p>
+            <a:r>
+              <a:rPr lang="en-US" dirty="0">
+                <a:hlinkClick r:id="rId2"/>
+              </a:rPr>
+              <a:t>Accessible via the GitHub link here</a:t>
+            </a:r>
+            <a:endParaRPr dirty="0"/>
           </a:p>
         </p:txBody>
       </p:sp>

</xml_diff>